<commit_message>
Anastasia's pass over algorithm section
</commit_message>
<xml_diff>
--- a/VLDB2018/flattening.pptx
+++ b/VLDB2018/flattening.pptx
@@ -6938,14 +6938,14 @@
             </a:extLst>
           </p:cNvPr>
           <p:cNvSpPr>
-            <a:spLocks noChangeAspect="1"/>
+            <a:spLocks/>
           </p:cNvSpPr>
           <p:nvPr/>
         </p:nvSpPr>
         <p:spPr>
           <a:xfrm>
-            <a:off x="238936" y="1052121"/>
-            <a:ext cx="5308784" cy="3317990"/>
+            <a:off x="67480" y="1052121"/>
+            <a:ext cx="5943600" cy="3317990"/>
           </a:xfrm>
           <a:prstGeom prst="roundRect">
             <a:avLst/>
@@ -7012,7 +7012,7 @@
         </p:nvSpPr>
         <p:spPr>
           <a:xfrm>
-            <a:off x="1868660" y="644418"/>
+            <a:off x="1725780" y="301516"/>
             <a:ext cx="2033183" cy="914400"/>
           </a:xfrm>
           <a:prstGeom prst="rect">
@@ -7031,7 +7031,7 @@
           <a:p>
             <a:pPr algn="ctr"/>
             <a:r>
-              <a:rPr lang="en-US" sz="2400" b="1" dirty="0"/>
+              <a:rPr lang="en-US" sz="4400" b="1" dirty="0"/>
               <a:t>Flat Segment</a:t>
             </a:r>
           </a:p>
@@ -7051,8 +7051,8 @@
         </p:nvSpPr>
         <p:spPr>
           <a:xfrm>
-            <a:off x="420831" y="2086048"/>
-            <a:ext cx="4928839" cy="2073357"/>
+            <a:off x="249375" y="2102483"/>
+            <a:ext cx="5516777" cy="2056922"/>
           </a:xfrm>
           <a:prstGeom prst="rect">
             <a:avLst/>
@@ -7088,24 +7088,24 @@
           <a:lstStyle/>
           <a:p>
             <a:r>
-              <a:rPr lang="en-US" b="1" dirty="0"/>
+              <a:rPr lang="en-US" sz="2800" b="1" dirty="0"/>
               <a:t>DATA</a:t>
             </a:r>
           </a:p>
           <a:p>
-            <a:endParaRPr lang="en-US" b="1" dirty="0"/>
-          </a:p>
-          <a:p>
-            <a:endParaRPr lang="en-US" b="1" dirty="0"/>
-          </a:p>
-        </p:txBody>
-      </p:sp>
-      <p:sp>
-        <p:nvSpPr>
-          <p:cNvPr id="177" name="Diamond 176">
-            <a:extLst>
-              <a:ext uri="{FF2B5EF4-FFF2-40B4-BE49-F238E27FC236}">
-                <a16:creationId xmlns:a16="http://schemas.microsoft.com/office/drawing/2014/main" id="{AB16EF4F-F7A3-5045-B2F2-502FCC3DD437}"/>
+            <a:endParaRPr lang="en-US" sz="2800" b="1" dirty="0"/>
+          </a:p>
+          <a:p>
+            <a:endParaRPr lang="en-US" sz="2800" b="1" dirty="0"/>
+          </a:p>
+        </p:txBody>
+      </p:sp>
+      <p:sp>
+        <p:nvSpPr>
+          <p:cNvPr id="227" name="Rectangle 226">
+            <a:extLst>
+              <a:ext uri="{FF2B5EF4-FFF2-40B4-BE49-F238E27FC236}">
+                <a16:creationId xmlns:a16="http://schemas.microsoft.com/office/drawing/2014/main" id="{9BDF5E56-508C-574B-B173-5252C9C44C18}"/>
               </a:ext>
             </a:extLst>
           </p:cNvPr>
@@ -7113,804 +7113,9 @@
           <p:nvPr/>
         </p:nvSpPr>
         <p:spPr>
-          <a:xfrm rot="18971391">
-            <a:off x="2262959" y="1583138"/>
-            <a:ext cx="210312" cy="210312"/>
-          </a:xfrm>
-          <a:prstGeom prst="diamond">
-            <a:avLst/>
-          </a:prstGeom>
-          <a:solidFill>
-            <a:srgbClr val="0070C0"/>
-          </a:solidFill>
-          <a:ln>
-            <a:solidFill>
-              <a:schemeClr val="tx1"/>
-            </a:solidFill>
-          </a:ln>
-        </p:spPr>
-        <p:style>
-          <a:lnRef idx="1">
-            <a:schemeClr val="accent6"/>
-          </a:lnRef>
-          <a:fillRef idx="3">
-            <a:schemeClr val="accent6"/>
-          </a:fillRef>
-          <a:effectRef idx="2">
-            <a:schemeClr val="accent6"/>
-          </a:effectRef>
-          <a:fontRef idx="minor">
-            <a:schemeClr val="lt1"/>
-          </a:fontRef>
-        </p:style>
-        <p:txBody>
-          <a:bodyPr rtlCol="0" anchor="t">
-            <a:normAutofit fontScale="25000" lnSpcReduction="20000"/>
-          </a:bodyPr>
-          <a:lstStyle/>
-          <a:p>
-            <a:pPr algn="ctr"/>
-            <a:endParaRPr lang="en-US" sz="1600" dirty="0" err="1">
-              <a:solidFill>
-                <a:schemeClr val="tx1"/>
-              </a:solidFill>
-              <a:latin typeface="Arial" pitchFamily="34" charset="0"/>
-              <a:cs typeface="Arial" pitchFamily="34" charset="0"/>
-            </a:endParaRPr>
-          </a:p>
-        </p:txBody>
-      </p:sp>
-      <p:cxnSp>
-        <p:nvCxnSpPr>
-          <p:cNvPr id="203" name="Straight Arrow Connector 202">
-            <a:extLst>
-              <a:ext uri="{FF2B5EF4-FFF2-40B4-BE49-F238E27FC236}">
-                <a16:creationId xmlns:a16="http://schemas.microsoft.com/office/drawing/2014/main" id="{2EAD6762-F5E4-5E4D-84B2-DACB9D691FCE}"/>
-              </a:ext>
-            </a:extLst>
-          </p:cNvPr>
-          <p:cNvCxnSpPr>
-            <a:cxnSpLocks/>
-            <a:stCxn id="212" idx="2"/>
-          </p:cNvCxnSpPr>
-          <p:nvPr/>
-        </p:nvCxnSpPr>
-        <p:spPr>
-          <a:xfrm flipH="1">
-            <a:off x="1417121" y="1764179"/>
-            <a:ext cx="1178380" cy="534171"/>
-          </a:xfrm>
-          <a:prstGeom prst="straightConnector1">
-            <a:avLst/>
-          </a:prstGeom>
-          <a:ln w="6350">
-            <a:solidFill>
-              <a:srgbClr val="000000"/>
-            </a:solidFill>
-            <a:tailEnd type="arrow"/>
-          </a:ln>
-        </p:spPr>
-        <p:style>
-          <a:lnRef idx="1">
-            <a:schemeClr val="accent1"/>
-          </a:lnRef>
-          <a:fillRef idx="0">
-            <a:schemeClr val="accent1"/>
-          </a:fillRef>
-          <a:effectRef idx="0">
-            <a:schemeClr val="accent1"/>
-          </a:effectRef>
-          <a:fontRef idx="minor">
-            <a:schemeClr val="tx1"/>
-          </a:fontRef>
-        </p:style>
-      </p:cxnSp>
-      <p:cxnSp>
-        <p:nvCxnSpPr>
-          <p:cNvPr id="204" name="Straight Arrow Connector 203">
-            <a:extLst>
-              <a:ext uri="{FF2B5EF4-FFF2-40B4-BE49-F238E27FC236}">
-                <a16:creationId xmlns:a16="http://schemas.microsoft.com/office/drawing/2014/main" id="{3D93965E-9518-A84E-BF0D-2129A62B67C4}"/>
-              </a:ext>
-            </a:extLst>
-          </p:cNvPr>
-          <p:cNvCxnSpPr>
-            <a:cxnSpLocks/>
-            <a:stCxn id="177" idx="1"/>
-          </p:cNvCxnSpPr>
-          <p:nvPr/>
-        </p:nvCxnSpPr>
-        <p:spPr>
-          <a:xfrm flipH="1">
-            <a:off x="940250" y="1761090"/>
-            <a:ext cx="1351980" cy="537260"/>
-          </a:xfrm>
-          <a:prstGeom prst="straightConnector1">
-            <a:avLst/>
-          </a:prstGeom>
-          <a:ln w="6350">
-            <a:solidFill>
-              <a:srgbClr val="000000"/>
-            </a:solidFill>
-            <a:tailEnd type="arrow"/>
-          </a:ln>
-        </p:spPr>
-        <p:style>
-          <a:lnRef idx="1">
-            <a:schemeClr val="accent1"/>
-          </a:lnRef>
-          <a:fillRef idx="0">
-            <a:schemeClr val="accent1"/>
-          </a:fillRef>
-          <a:effectRef idx="0">
-            <a:schemeClr val="accent1"/>
-          </a:effectRef>
-          <a:fontRef idx="minor">
-            <a:schemeClr val="tx1"/>
-          </a:fontRef>
-        </p:style>
-      </p:cxnSp>
-      <p:cxnSp>
-        <p:nvCxnSpPr>
-          <p:cNvPr id="205" name="Straight Arrow Connector 204">
-            <a:extLst>
-              <a:ext uri="{FF2B5EF4-FFF2-40B4-BE49-F238E27FC236}">
-                <a16:creationId xmlns:a16="http://schemas.microsoft.com/office/drawing/2014/main" id="{609FEF21-1633-9C45-9843-161EC63C470B}"/>
-              </a:ext>
-            </a:extLst>
-          </p:cNvPr>
-          <p:cNvCxnSpPr>
-            <a:cxnSpLocks/>
-            <a:stCxn id="210" idx="2"/>
-          </p:cNvCxnSpPr>
-          <p:nvPr/>
-        </p:nvCxnSpPr>
-        <p:spPr>
-          <a:xfrm flipH="1">
-            <a:off x="2347771" y="1764179"/>
-            <a:ext cx="402320" cy="553019"/>
-          </a:xfrm>
-          <a:prstGeom prst="straightConnector1">
-            <a:avLst/>
-          </a:prstGeom>
-          <a:ln w="6350">
-            <a:solidFill>
-              <a:srgbClr val="000000"/>
-            </a:solidFill>
-            <a:tailEnd type="arrow"/>
-          </a:ln>
-        </p:spPr>
-        <p:style>
-          <a:lnRef idx="1">
-            <a:schemeClr val="accent1"/>
-          </a:lnRef>
-          <a:fillRef idx="0">
-            <a:schemeClr val="accent1"/>
-          </a:fillRef>
-          <a:effectRef idx="0">
-            <a:schemeClr val="accent1"/>
-          </a:effectRef>
-          <a:fontRef idx="minor">
-            <a:schemeClr val="tx1"/>
-          </a:fontRef>
-        </p:style>
-      </p:cxnSp>
-      <p:cxnSp>
-        <p:nvCxnSpPr>
-          <p:cNvPr id="206" name="Straight Arrow Connector 205">
-            <a:extLst>
-              <a:ext uri="{FF2B5EF4-FFF2-40B4-BE49-F238E27FC236}">
-                <a16:creationId xmlns:a16="http://schemas.microsoft.com/office/drawing/2014/main" id="{BB9C85B4-571B-BD4B-A070-D91785DE77F1}"/>
-              </a:ext>
-            </a:extLst>
-          </p:cNvPr>
-          <p:cNvCxnSpPr>
-            <a:cxnSpLocks/>
-            <a:stCxn id="213" idx="1"/>
-          </p:cNvCxnSpPr>
-          <p:nvPr/>
-        </p:nvCxnSpPr>
-        <p:spPr>
-          <a:xfrm flipH="1">
-            <a:off x="2907159" y="1761090"/>
-            <a:ext cx="10628" cy="542394"/>
-          </a:xfrm>
-          <a:prstGeom prst="straightConnector1">
-            <a:avLst/>
-          </a:prstGeom>
-          <a:ln w="6350">
-            <a:solidFill>
-              <a:srgbClr val="000000"/>
-            </a:solidFill>
-            <a:tailEnd type="arrow"/>
-          </a:ln>
-        </p:spPr>
-        <p:style>
-          <a:lnRef idx="1">
-            <a:schemeClr val="accent1"/>
-          </a:lnRef>
-          <a:fillRef idx="0">
-            <a:schemeClr val="accent1"/>
-          </a:fillRef>
-          <a:effectRef idx="0">
-            <a:schemeClr val="accent1"/>
-          </a:effectRef>
-          <a:fontRef idx="minor">
-            <a:schemeClr val="tx1"/>
-          </a:fontRef>
-        </p:style>
-      </p:cxnSp>
-      <p:cxnSp>
-        <p:nvCxnSpPr>
-          <p:cNvPr id="207" name="Straight Arrow Connector 206">
-            <a:extLst>
-              <a:ext uri="{FF2B5EF4-FFF2-40B4-BE49-F238E27FC236}">
-                <a16:creationId xmlns:a16="http://schemas.microsoft.com/office/drawing/2014/main" id="{530460FD-B49A-6441-B04E-454DF3E5FF17}"/>
-              </a:ext>
-            </a:extLst>
-          </p:cNvPr>
-          <p:cNvCxnSpPr>
-            <a:cxnSpLocks/>
-            <a:stCxn id="216" idx="1"/>
-          </p:cNvCxnSpPr>
-          <p:nvPr/>
-        </p:nvCxnSpPr>
-        <p:spPr>
-          <a:xfrm>
-            <a:off x="3072377" y="1761090"/>
-            <a:ext cx="376308" cy="526664"/>
-          </a:xfrm>
-          <a:prstGeom prst="straightConnector1">
-            <a:avLst/>
-          </a:prstGeom>
-          <a:ln w="6350">
-            <a:solidFill>
-              <a:srgbClr val="000000"/>
-            </a:solidFill>
-            <a:tailEnd type="arrow"/>
-          </a:ln>
-        </p:spPr>
-        <p:style>
-          <a:lnRef idx="1">
-            <a:schemeClr val="accent1"/>
-          </a:lnRef>
-          <a:fillRef idx="0">
-            <a:schemeClr val="accent1"/>
-          </a:fillRef>
-          <a:effectRef idx="0">
-            <a:schemeClr val="accent1"/>
-          </a:effectRef>
-          <a:fontRef idx="minor">
-            <a:schemeClr val="tx1"/>
-          </a:fontRef>
-        </p:style>
-      </p:cxnSp>
-      <p:cxnSp>
-        <p:nvCxnSpPr>
-          <p:cNvPr id="208" name="Straight Arrow Connector 207">
-            <a:extLst>
-              <a:ext uri="{FF2B5EF4-FFF2-40B4-BE49-F238E27FC236}">
-                <a16:creationId xmlns:a16="http://schemas.microsoft.com/office/drawing/2014/main" id="{B0F21332-AAC5-BA48-BB5D-06FF9AD316BD}"/>
-              </a:ext>
-            </a:extLst>
-          </p:cNvPr>
-          <p:cNvCxnSpPr>
-            <a:cxnSpLocks/>
-            <a:stCxn id="214" idx="2"/>
-          </p:cNvCxnSpPr>
-          <p:nvPr/>
-        </p:nvCxnSpPr>
-        <p:spPr>
-          <a:xfrm>
-            <a:off x="3375648" y="1764179"/>
-            <a:ext cx="583378" cy="523575"/>
-          </a:xfrm>
-          <a:prstGeom prst="straightConnector1">
-            <a:avLst/>
-          </a:prstGeom>
-          <a:ln w="6350">
-            <a:solidFill>
-              <a:srgbClr val="000000"/>
-            </a:solidFill>
-            <a:tailEnd type="arrow"/>
-          </a:ln>
-        </p:spPr>
-        <p:style>
-          <a:lnRef idx="1">
-            <a:schemeClr val="accent1"/>
-          </a:lnRef>
-          <a:fillRef idx="0">
-            <a:schemeClr val="accent1"/>
-          </a:fillRef>
-          <a:effectRef idx="0">
-            <a:schemeClr val="accent1"/>
-          </a:effectRef>
-          <a:fontRef idx="minor">
-            <a:schemeClr val="tx1"/>
-          </a:fontRef>
-        </p:style>
-      </p:cxnSp>
-      <p:cxnSp>
-        <p:nvCxnSpPr>
-          <p:cNvPr id="209" name="Straight Arrow Connector 208">
-            <a:extLst>
-              <a:ext uri="{FF2B5EF4-FFF2-40B4-BE49-F238E27FC236}">
-                <a16:creationId xmlns:a16="http://schemas.microsoft.com/office/drawing/2014/main" id="{BE477BA6-F4DD-FA46-A858-BA7895D4381B}"/>
-              </a:ext>
-            </a:extLst>
-          </p:cNvPr>
-          <p:cNvCxnSpPr>
-            <a:cxnSpLocks/>
-            <a:stCxn id="215" idx="2"/>
-          </p:cNvCxnSpPr>
-          <p:nvPr/>
-        </p:nvCxnSpPr>
-        <p:spPr>
-          <a:xfrm>
-            <a:off x="3530237" y="1764179"/>
-            <a:ext cx="966312" cy="534171"/>
-          </a:xfrm>
-          <a:prstGeom prst="straightConnector1">
-            <a:avLst/>
-          </a:prstGeom>
-          <a:ln w="6350">
-            <a:solidFill>
-              <a:srgbClr val="000000"/>
-            </a:solidFill>
-            <a:tailEnd type="arrow"/>
-          </a:ln>
-        </p:spPr>
-        <p:style>
-          <a:lnRef idx="1">
-            <a:schemeClr val="accent1"/>
-          </a:lnRef>
-          <a:fillRef idx="0">
-            <a:schemeClr val="accent1"/>
-          </a:fillRef>
-          <a:effectRef idx="0">
-            <a:schemeClr val="accent1"/>
-          </a:effectRef>
-          <a:fontRef idx="minor">
-            <a:schemeClr val="tx1"/>
-          </a:fontRef>
-        </p:style>
-      </p:cxnSp>
-      <p:sp>
-        <p:nvSpPr>
-          <p:cNvPr id="210" name="Diamond 209">
-            <a:extLst>
-              <a:ext uri="{FF2B5EF4-FFF2-40B4-BE49-F238E27FC236}">
-                <a16:creationId xmlns:a16="http://schemas.microsoft.com/office/drawing/2014/main" id="{C087EB16-E519-1B4F-A135-F4D22BD9323C}"/>
-              </a:ext>
-            </a:extLst>
-          </p:cNvPr>
-          <p:cNvSpPr/>
-          <p:nvPr/>
-        </p:nvSpPr>
-        <p:spPr>
-          <a:xfrm rot="18971391">
-            <a:off x="2572139" y="1583138"/>
-            <a:ext cx="210312" cy="210312"/>
-          </a:xfrm>
-          <a:prstGeom prst="diamond">
-            <a:avLst/>
-          </a:prstGeom>
-          <a:solidFill>
-            <a:srgbClr val="0070C0"/>
-          </a:solidFill>
-          <a:ln>
-            <a:solidFill>
-              <a:schemeClr val="tx1"/>
-            </a:solidFill>
-          </a:ln>
-        </p:spPr>
-        <p:style>
-          <a:lnRef idx="1">
-            <a:schemeClr val="accent6"/>
-          </a:lnRef>
-          <a:fillRef idx="3">
-            <a:schemeClr val="accent6"/>
-          </a:fillRef>
-          <a:effectRef idx="2">
-            <a:schemeClr val="accent6"/>
-          </a:effectRef>
-          <a:fontRef idx="minor">
-            <a:schemeClr val="lt1"/>
-          </a:fontRef>
-        </p:style>
-        <p:txBody>
-          <a:bodyPr rtlCol="0" anchor="t">
-            <a:normAutofit fontScale="25000" lnSpcReduction="20000"/>
-          </a:bodyPr>
-          <a:lstStyle/>
-          <a:p>
-            <a:pPr algn="ctr"/>
-            <a:endParaRPr lang="en-US" sz="1600" dirty="0" err="1">
-              <a:solidFill>
-                <a:schemeClr val="tx1"/>
-              </a:solidFill>
-              <a:latin typeface="Arial" pitchFamily="34" charset="0"/>
-              <a:cs typeface="Arial" pitchFamily="34" charset="0"/>
-            </a:endParaRPr>
-          </a:p>
-        </p:txBody>
-      </p:sp>
-      <p:sp>
-        <p:nvSpPr>
-          <p:cNvPr id="211" name="Diamond 210">
-            <a:extLst>
-              <a:ext uri="{FF2B5EF4-FFF2-40B4-BE49-F238E27FC236}">
-                <a16:creationId xmlns:a16="http://schemas.microsoft.com/office/drawing/2014/main" id="{231A0675-2A4F-3F44-9FD4-B88B20C50103}"/>
-              </a:ext>
-            </a:extLst>
-          </p:cNvPr>
-          <p:cNvSpPr/>
-          <p:nvPr/>
-        </p:nvSpPr>
-        <p:spPr>
-          <a:xfrm rot="18971391">
-            <a:off x="2726728" y="1583138"/>
-            <a:ext cx="210312" cy="210312"/>
-          </a:xfrm>
-          <a:prstGeom prst="diamond">
-            <a:avLst/>
-          </a:prstGeom>
-          <a:solidFill>
-            <a:srgbClr val="0070C0"/>
-          </a:solidFill>
-          <a:ln>
-            <a:solidFill>
-              <a:schemeClr val="tx1"/>
-            </a:solidFill>
-          </a:ln>
-        </p:spPr>
-        <p:style>
-          <a:lnRef idx="1">
-            <a:schemeClr val="accent6"/>
-          </a:lnRef>
-          <a:fillRef idx="3">
-            <a:schemeClr val="accent6"/>
-          </a:fillRef>
-          <a:effectRef idx="2">
-            <a:schemeClr val="accent6"/>
-          </a:effectRef>
-          <a:fontRef idx="minor">
-            <a:schemeClr val="lt1"/>
-          </a:fontRef>
-        </p:style>
-        <p:txBody>
-          <a:bodyPr rtlCol="0" anchor="t">
-            <a:normAutofit fontScale="25000" lnSpcReduction="20000"/>
-          </a:bodyPr>
-          <a:lstStyle/>
-          <a:p>
-            <a:pPr algn="ctr"/>
-            <a:endParaRPr lang="en-US" sz="1600" dirty="0" err="1">
-              <a:solidFill>
-                <a:schemeClr val="tx1"/>
-              </a:solidFill>
-              <a:latin typeface="Arial" pitchFamily="34" charset="0"/>
-              <a:cs typeface="Arial" pitchFamily="34" charset="0"/>
-            </a:endParaRPr>
-          </a:p>
-        </p:txBody>
-      </p:sp>
-      <p:sp>
-        <p:nvSpPr>
-          <p:cNvPr id="212" name="Diamond 211">
-            <a:extLst>
-              <a:ext uri="{FF2B5EF4-FFF2-40B4-BE49-F238E27FC236}">
-                <a16:creationId xmlns:a16="http://schemas.microsoft.com/office/drawing/2014/main" id="{90FAD0A0-6D96-EE41-BEEB-7ECD114B6AC1}"/>
-              </a:ext>
-            </a:extLst>
-          </p:cNvPr>
-          <p:cNvSpPr/>
-          <p:nvPr/>
-        </p:nvSpPr>
-        <p:spPr>
-          <a:xfrm rot="18971391">
-            <a:off x="2417549" y="1583138"/>
-            <a:ext cx="210312" cy="210312"/>
-          </a:xfrm>
-          <a:prstGeom prst="diamond">
-            <a:avLst/>
-          </a:prstGeom>
-          <a:solidFill>
-            <a:srgbClr val="0070C0"/>
-          </a:solidFill>
-          <a:ln>
-            <a:solidFill>
-              <a:schemeClr val="tx1"/>
-            </a:solidFill>
-          </a:ln>
-        </p:spPr>
-        <p:style>
-          <a:lnRef idx="1">
-            <a:schemeClr val="accent6"/>
-          </a:lnRef>
-          <a:fillRef idx="3">
-            <a:schemeClr val="accent6"/>
-          </a:fillRef>
-          <a:effectRef idx="2">
-            <a:schemeClr val="accent6"/>
-          </a:effectRef>
-          <a:fontRef idx="minor">
-            <a:schemeClr val="lt1"/>
-          </a:fontRef>
-        </p:style>
-        <p:txBody>
-          <a:bodyPr rtlCol="0" anchor="t">
-            <a:normAutofit fontScale="25000" lnSpcReduction="20000"/>
-          </a:bodyPr>
-          <a:lstStyle/>
-          <a:p>
-            <a:pPr algn="ctr"/>
-            <a:endParaRPr lang="en-US" sz="1600" dirty="0" err="1">
-              <a:solidFill>
-                <a:schemeClr val="tx1"/>
-              </a:solidFill>
-              <a:latin typeface="Arial" pitchFamily="34" charset="0"/>
-              <a:cs typeface="Arial" pitchFamily="34" charset="0"/>
-            </a:endParaRPr>
-          </a:p>
-        </p:txBody>
-      </p:sp>
-      <p:sp>
-        <p:nvSpPr>
-          <p:cNvPr id="213" name="Diamond 212">
-            <a:extLst>
-              <a:ext uri="{FF2B5EF4-FFF2-40B4-BE49-F238E27FC236}">
-                <a16:creationId xmlns:a16="http://schemas.microsoft.com/office/drawing/2014/main" id="{5E913281-94A1-134C-A5F0-1E8BB94FD2DD}"/>
-              </a:ext>
-            </a:extLst>
-          </p:cNvPr>
-          <p:cNvSpPr/>
-          <p:nvPr/>
-        </p:nvSpPr>
-        <p:spPr>
-          <a:xfrm rot="18971391">
-            <a:off x="2888516" y="1583138"/>
-            <a:ext cx="210312" cy="210312"/>
-          </a:xfrm>
-          <a:prstGeom prst="diamond">
-            <a:avLst/>
-          </a:prstGeom>
-          <a:solidFill>
-            <a:srgbClr val="0070C0"/>
-          </a:solidFill>
-          <a:ln>
-            <a:solidFill>
-              <a:schemeClr val="tx1"/>
-            </a:solidFill>
-          </a:ln>
-        </p:spPr>
-        <p:style>
-          <a:lnRef idx="1">
-            <a:schemeClr val="accent6"/>
-          </a:lnRef>
-          <a:fillRef idx="3">
-            <a:schemeClr val="accent6"/>
-          </a:fillRef>
-          <a:effectRef idx="2">
-            <a:schemeClr val="accent6"/>
-          </a:effectRef>
-          <a:fontRef idx="minor">
-            <a:schemeClr val="lt1"/>
-          </a:fontRef>
-        </p:style>
-        <p:txBody>
-          <a:bodyPr rtlCol="0" anchor="t">
-            <a:normAutofit fontScale="25000" lnSpcReduction="20000"/>
-          </a:bodyPr>
-          <a:lstStyle/>
-          <a:p>
-            <a:pPr algn="ctr"/>
-            <a:endParaRPr lang="en-US" sz="1600" dirty="0" err="1">
-              <a:solidFill>
-                <a:schemeClr val="tx1"/>
-              </a:solidFill>
-              <a:latin typeface="Arial" pitchFamily="34" charset="0"/>
-              <a:cs typeface="Arial" pitchFamily="34" charset="0"/>
-            </a:endParaRPr>
-          </a:p>
-        </p:txBody>
-      </p:sp>
-      <p:sp>
-        <p:nvSpPr>
-          <p:cNvPr id="214" name="Diamond 213">
-            <a:extLst>
-              <a:ext uri="{FF2B5EF4-FFF2-40B4-BE49-F238E27FC236}">
-                <a16:creationId xmlns:a16="http://schemas.microsoft.com/office/drawing/2014/main" id="{3B777B00-E62A-DD46-8A7C-171B83B1EAFD}"/>
-              </a:ext>
-            </a:extLst>
-          </p:cNvPr>
-          <p:cNvSpPr/>
-          <p:nvPr/>
-        </p:nvSpPr>
-        <p:spPr>
-          <a:xfrm rot="18971391">
-            <a:off x="3197696" y="1583138"/>
-            <a:ext cx="210312" cy="210312"/>
-          </a:xfrm>
-          <a:prstGeom prst="diamond">
-            <a:avLst/>
-          </a:prstGeom>
-          <a:solidFill>
-            <a:srgbClr val="0070C0"/>
-          </a:solidFill>
-          <a:ln>
-            <a:solidFill>
-              <a:schemeClr val="tx1"/>
-            </a:solidFill>
-          </a:ln>
-        </p:spPr>
-        <p:style>
-          <a:lnRef idx="1">
-            <a:schemeClr val="accent6"/>
-          </a:lnRef>
-          <a:fillRef idx="3">
-            <a:schemeClr val="accent6"/>
-          </a:fillRef>
-          <a:effectRef idx="2">
-            <a:schemeClr val="accent6"/>
-          </a:effectRef>
-          <a:fontRef idx="minor">
-            <a:schemeClr val="lt1"/>
-          </a:fontRef>
-        </p:style>
-        <p:txBody>
-          <a:bodyPr rtlCol="0" anchor="t">
-            <a:normAutofit fontScale="25000" lnSpcReduction="20000"/>
-          </a:bodyPr>
-          <a:lstStyle/>
-          <a:p>
-            <a:pPr algn="ctr"/>
-            <a:endParaRPr lang="en-US" sz="1600" dirty="0" err="1">
-              <a:solidFill>
-                <a:schemeClr val="tx1"/>
-              </a:solidFill>
-              <a:latin typeface="Arial" pitchFamily="34" charset="0"/>
-              <a:cs typeface="Arial" pitchFamily="34" charset="0"/>
-            </a:endParaRPr>
-          </a:p>
-        </p:txBody>
-      </p:sp>
-      <p:sp>
-        <p:nvSpPr>
-          <p:cNvPr id="215" name="Diamond 214">
-            <a:extLst>
-              <a:ext uri="{FF2B5EF4-FFF2-40B4-BE49-F238E27FC236}">
-                <a16:creationId xmlns:a16="http://schemas.microsoft.com/office/drawing/2014/main" id="{5F370D92-C997-5B43-8C67-C18418B337B5}"/>
-              </a:ext>
-            </a:extLst>
-          </p:cNvPr>
-          <p:cNvSpPr/>
-          <p:nvPr/>
-        </p:nvSpPr>
-        <p:spPr>
-          <a:xfrm rot="18971391">
-            <a:off x="3352285" y="1583138"/>
-            <a:ext cx="210312" cy="210312"/>
-          </a:xfrm>
-          <a:prstGeom prst="diamond">
-            <a:avLst/>
-          </a:prstGeom>
-          <a:solidFill>
-            <a:srgbClr val="0070C0"/>
-          </a:solidFill>
-          <a:ln>
-            <a:solidFill>
-              <a:schemeClr val="tx1"/>
-            </a:solidFill>
-          </a:ln>
-        </p:spPr>
-        <p:style>
-          <a:lnRef idx="1">
-            <a:schemeClr val="accent6"/>
-          </a:lnRef>
-          <a:fillRef idx="3">
-            <a:schemeClr val="accent6"/>
-          </a:fillRef>
-          <a:effectRef idx="2">
-            <a:schemeClr val="accent6"/>
-          </a:effectRef>
-          <a:fontRef idx="minor">
-            <a:schemeClr val="lt1"/>
-          </a:fontRef>
-        </p:style>
-        <p:txBody>
-          <a:bodyPr rtlCol="0" anchor="t">
-            <a:normAutofit fontScale="25000" lnSpcReduction="20000"/>
-          </a:bodyPr>
-          <a:lstStyle/>
-          <a:p>
-            <a:pPr algn="ctr"/>
-            <a:endParaRPr lang="en-US" sz="1600" dirty="0" err="1">
-              <a:solidFill>
-                <a:schemeClr val="tx1"/>
-              </a:solidFill>
-              <a:latin typeface="Arial" pitchFamily="34" charset="0"/>
-              <a:cs typeface="Arial" pitchFamily="34" charset="0"/>
-            </a:endParaRPr>
-          </a:p>
-        </p:txBody>
-      </p:sp>
-      <p:sp>
-        <p:nvSpPr>
-          <p:cNvPr id="216" name="Diamond 215">
-            <a:extLst>
-              <a:ext uri="{FF2B5EF4-FFF2-40B4-BE49-F238E27FC236}">
-                <a16:creationId xmlns:a16="http://schemas.microsoft.com/office/drawing/2014/main" id="{96822EFE-0D15-2042-BD72-30E19C13FF80}"/>
-              </a:ext>
-            </a:extLst>
-          </p:cNvPr>
-          <p:cNvSpPr/>
-          <p:nvPr/>
-        </p:nvSpPr>
-        <p:spPr>
-          <a:xfrm rot="18971391">
-            <a:off x="3043106" y="1583138"/>
-            <a:ext cx="210312" cy="210312"/>
-          </a:xfrm>
-          <a:prstGeom prst="diamond">
-            <a:avLst/>
-          </a:prstGeom>
-          <a:solidFill>
-            <a:srgbClr val="0070C0"/>
-          </a:solidFill>
-          <a:ln>
-            <a:solidFill>
-              <a:schemeClr val="tx1"/>
-            </a:solidFill>
-          </a:ln>
-        </p:spPr>
-        <p:style>
-          <a:lnRef idx="1">
-            <a:schemeClr val="accent6"/>
-          </a:lnRef>
-          <a:fillRef idx="3">
-            <a:schemeClr val="accent6"/>
-          </a:fillRef>
-          <a:effectRef idx="2">
-            <a:schemeClr val="accent6"/>
-          </a:effectRef>
-          <a:fontRef idx="minor">
-            <a:schemeClr val="lt1"/>
-          </a:fontRef>
-        </p:style>
-        <p:txBody>
-          <a:bodyPr rtlCol="0" anchor="t">
-            <a:normAutofit fontScale="25000" lnSpcReduction="20000"/>
-          </a:bodyPr>
-          <a:lstStyle/>
-          <a:p>
-            <a:pPr algn="ctr"/>
-            <a:endParaRPr lang="en-US" sz="1600" dirty="0" err="1">
-              <a:solidFill>
-                <a:schemeClr val="tx1"/>
-              </a:solidFill>
-              <a:latin typeface="Arial" pitchFamily="34" charset="0"/>
-              <a:cs typeface="Arial" pitchFamily="34" charset="0"/>
-            </a:endParaRPr>
-          </a:p>
-        </p:txBody>
-      </p:sp>
-      <p:sp>
-        <p:nvSpPr>
-          <p:cNvPr id="227" name="Rectangle 226">
-            <a:extLst>
-              <a:ext uri="{FF2B5EF4-FFF2-40B4-BE49-F238E27FC236}">
-                <a16:creationId xmlns:a16="http://schemas.microsoft.com/office/drawing/2014/main" id="{9BDF5E56-508C-574B-B173-5252C9C44C18}"/>
-              </a:ext>
-            </a:extLst>
-          </p:cNvPr>
-          <p:cNvSpPr/>
-          <p:nvPr/>
-        </p:nvSpPr>
-        <p:spPr>
-          <a:xfrm>
-            <a:off x="420831" y="1274106"/>
-            <a:ext cx="4928839" cy="811942"/>
+          <a:xfrm>
+            <a:off x="249375" y="1274106"/>
+            <a:ext cx="5516777" cy="828378"/>
           </a:xfrm>
           <a:prstGeom prst="rect">
             <a:avLst/>
@@ -7941,12 +7146,12 @@
           <a:lstStyle/>
           <a:p>
             <a:r>
-              <a:rPr lang="en-US" b="1" dirty="0">
+              <a:rPr lang="en-US" sz="2800" b="1" dirty="0">
                 <a:solidFill>
                   <a:schemeClr val="tx1"/>
                 </a:solidFill>
               </a:rPr>
-              <a:t>  INDEX</a:t>
+              <a:t>INDEX</a:t>
             </a:r>
           </a:p>
         </p:txBody>
@@ -7960,13 +7165,15 @@
               </a:ext>
             </a:extLst>
           </p:cNvPr>
-          <p:cNvSpPr/>
-          <p:nvPr/>
-        </p:nvSpPr>
-        <p:spPr>
-          <a:xfrm>
-            <a:off x="691187" y="2287754"/>
-            <a:ext cx="334537" cy="323385"/>
+          <p:cNvSpPr>
+            <a:spLocks/>
+          </p:cNvSpPr>
+          <p:nvPr/>
+        </p:nvSpPr>
+        <p:spPr>
+          <a:xfrm>
+            <a:off x="1091227" y="2282744"/>
+            <a:ext cx="475488" cy="353567"/>
           </a:xfrm>
           <a:prstGeom prst="ellipse">
             <a:avLst/>
@@ -7989,11 +7196,14 @@
           </a:fontRef>
         </p:style>
         <p:txBody>
-          <a:bodyPr rtlCol="0" anchor="ctr"/>
+          <a:bodyPr lIns="0" tIns="0" rIns="0" bIns="0" rtlCol="0" anchor="ctr"/>
           <a:lstStyle/>
           <a:p>
             <a:pPr algn="ctr"/>
-            <a:endParaRPr lang="en-US"/>
+            <a:r>
+              <a:rPr lang="en-US" b="1" dirty="0"/>
+              <a:t>cell</a:t>
+            </a:r>
           </a:p>
         </p:txBody>
       </p:sp>
@@ -8006,13 +7216,15 @@
               </a:ext>
             </a:extLst>
           </p:cNvPr>
-          <p:cNvSpPr/>
-          <p:nvPr/>
-        </p:nvSpPr>
-        <p:spPr>
-          <a:xfrm>
-            <a:off x="1270642" y="2296065"/>
-            <a:ext cx="334537" cy="323385"/>
+          <p:cNvSpPr>
+            <a:spLocks/>
+          </p:cNvSpPr>
+          <p:nvPr/>
+        </p:nvSpPr>
+        <p:spPr>
+          <a:xfrm>
+            <a:off x="1697576" y="2282744"/>
+            <a:ext cx="475488" cy="353567"/>
           </a:xfrm>
           <a:prstGeom prst="ellipse">
             <a:avLst/>
@@ -8035,11 +7247,14 @@
           </a:fontRef>
         </p:style>
         <p:txBody>
-          <a:bodyPr rtlCol="0" anchor="ctr"/>
+          <a:bodyPr lIns="0" tIns="0" rIns="0" bIns="0" rtlCol="0" anchor="ctr"/>
           <a:lstStyle/>
           <a:p>
             <a:pPr algn="ctr"/>
-            <a:endParaRPr lang="en-US"/>
+            <a:r>
+              <a:rPr lang="en-US" b="1" dirty="0"/>
+              <a:t>cell</a:t>
+            </a:r>
           </a:p>
         </p:txBody>
       </p:sp>
@@ -8052,13 +7267,15 @@
               </a:ext>
             </a:extLst>
           </p:cNvPr>
-          <p:cNvSpPr/>
-          <p:nvPr/>
-        </p:nvSpPr>
-        <p:spPr>
-          <a:xfrm>
-            <a:off x="3260531" y="2314594"/>
-            <a:ext cx="334537" cy="323385"/>
+          <p:cNvSpPr>
+            <a:spLocks/>
+          </p:cNvSpPr>
+          <p:nvPr/>
+        </p:nvSpPr>
+        <p:spPr>
+          <a:xfrm>
+            <a:off x="3516623" y="2282744"/>
+            <a:ext cx="475488" cy="353567"/>
           </a:xfrm>
           <a:prstGeom prst="ellipse">
             <a:avLst/>
@@ -8081,11 +7298,14 @@
           </a:fontRef>
         </p:style>
         <p:txBody>
-          <a:bodyPr rtlCol="0" anchor="ctr"/>
+          <a:bodyPr lIns="0" tIns="0" rIns="0" bIns="0" rtlCol="0" anchor="ctr"/>
           <a:lstStyle/>
           <a:p>
             <a:pPr algn="ctr"/>
-            <a:endParaRPr lang="en-US"/>
+            <a:r>
+              <a:rPr lang="en-US" b="1" dirty="0"/>
+              <a:t>cell</a:t>
+            </a:r>
           </a:p>
         </p:txBody>
       </p:sp>
@@ -8098,13 +7318,15 @@
               </a:ext>
             </a:extLst>
           </p:cNvPr>
-          <p:cNvSpPr/>
-          <p:nvPr/>
-        </p:nvSpPr>
-        <p:spPr>
-          <a:xfrm>
-            <a:off x="3801884" y="2314594"/>
-            <a:ext cx="334537" cy="323385"/>
+          <p:cNvSpPr>
+            <a:spLocks/>
+          </p:cNvSpPr>
+          <p:nvPr/>
+        </p:nvSpPr>
+        <p:spPr>
+          <a:xfrm>
+            <a:off x="4122972" y="2282744"/>
+            <a:ext cx="475488" cy="353567"/>
           </a:xfrm>
           <a:prstGeom prst="ellipse">
             <a:avLst/>
@@ -8127,11 +7349,14 @@
           </a:fontRef>
         </p:style>
         <p:txBody>
-          <a:bodyPr rtlCol="0" anchor="ctr"/>
+          <a:bodyPr lIns="0" tIns="0" rIns="0" bIns="0" rtlCol="0" anchor="ctr"/>
           <a:lstStyle/>
           <a:p>
             <a:pPr algn="ctr"/>
-            <a:endParaRPr lang="en-US"/>
+            <a:r>
+              <a:rPr lang="en-US" b="1" dirty="0"/>
+              <a:t>cell</a:t>
+            </a:r>
           </a:p>
         </p:txBody>
       </p:sp>
@@ -8144,13 +7369,15 @@
               </a:ext>
             </a:extLst>
           </p:cNvPr>
-          <p:cNvSpPr/>
-          <p:nvPr/>
-        </p:nvSpPr>
-        <p:spPr>
-          <a:xfrm>
-            <a:off x="4329280" y="2314595"/>
-            <a:ext cx="334537" cy="323385"/>
+          <p:cNvSpPr>
+            <a:spLocks/>
+          </p:cNvSpPr>
+          <p:nvPr/>
+        </p:nvSpPr>
+        <p:spPr>
+          <a:xfrm>
+            <a:off x="4729320" y="2282744"/>
+            <a:ext cx="475488" cy="353567"/>
           </a:xfrm>
           <a:prstGeom prst="ellipse">
             <a:avLst/>
@@ -8173,11 +7400,14 @@
           </a:fontRef>
         </p:style>
         <p:txBody>
-          <a:bodyPr rtlCol="0" anchor="ctr"/>
+          <a:bodyPr lIns="0" tIns="0" rIns="0" bIns="0" rtlCol="0" anchor="ctr"/>
           <a:lstStyle/>
           <a:p>
             <a:pPr algn="ctr"/>
-            <a:endParaRPr lang="en-US"/>
+            <a:r>
+              <a:rPr lang="en-US" b="1" dirty="0"/>
+              <a:t>cell</a:t>
+            </a:r>
           </a:p>
         </p:txBody>
       </p:sp>
@@ -8190,13 +7420,15 @@
               </a:ext>
             </a:extLst>
           </p:cNvPr>
-          <p:cNvSpPr/>
-          <p:nvPr/>
-        </p:nvSpPr>
-        <p:spPr>
-          <a:xfrm>
-            <a:off x="2727944" y="2305057"/>
-            <a:ext cx="334537" cy="323385"/>
+          <p:cNvSpPr>
+            <a:spLocks/>
+          </p:cNvSpPr>
+          <p:nvPr/>
+        </p:nvSpPr>
+        <p:spPr>
+          <a:xfrm>
+            <a:off x="2910274" y="2282744"/>
+            <a:ext cx="475488" cy="353567"/>
           </a:xfrm>
           <a:prstGeom prst="ellipse">
             <a:avLst/>
@@ -8219,11 +7451,14 @@
           </a:fontRef>
         </p:style>
         <p:txBody>
-          <a:bodyPr rtlCol="0" anchor="ctr"/>
+          <a:bodyPr lIns="0" tIns="0" rIns="0" bIns="0" rtlCol="0" anchor="ctr"/>
           <a:lstStyle/>
           <a:p>
             <a:pPr algn="ctr"/>
-            <a:endParaRPr lang="en-US"/>
+            <a:r>
+              <a:rPr lang="en-US" b="1" dirty="0"/>
+              <a:t>cell</a:t>
+            </a:r>
           </a:p>
         </p:txBody>
       </p:sp>
@@ -8236,13 +7471,15 @@
               </a:ext>
             </a:extLst>
           </p:cNvPr>
-          <p:cNvSpPr/>
-          <p:nvPr/>
-        </p:nvSpPr>
-        <p:spPr>
-          <a:xfrm>
-            <a:off x="2067869" y="2282744"/>
-            <a:ext cx="334537" cy="323385"/>
+          <p:cNvSpPr>
+            <a:spLocks/>
+          </p:cNvSpPr>
+          <p:nvPr/>
+        </p:nvSpPr>
+        <p:spPr>
+          <a:xfrm>
+            <a:off x="2303925" y="2282744"/>
+            <a:ext cx="475488" cy="353567"/>
           </a:xfrm>
           <a:prstGeom prst="ellipse">
             <a:avLst/>
@@ -8265,11 +7502,14 @@
           </a:fontRef>
         </p:style>
         <p:txBody>
-          <a:bodyPr rtlCol="0" anchor="ctr"/>
+          <a:bodyPr lIns="0" tIns="0" rIns="0" bIns="0" rtlCol="0" anchor="ctr"/>
           <a:lstStyle/>
           <a:p>
             <a:pPr algn="ctr"/>
-            <a:endParaRPr lang="en-US"/>
+            <a:r>
+              <a:rPr lang="en-US" b="1" dirty="0"/>
+              <a:t>cell</a:t>
+            </a:r>
           </a:p>
         </p:txBody>
       </p:sp>
@@ -8287,7 +7527,7 @@
         </p:nvSpPr>
         <p:spPr>
           <a:xfrm>
-            <a:off x="525442" y="3099696"/>
+            <a:off x="825480" y="3099696"/>
             <a:ext cx="3610979" cy="446049"/>
           </a:xfrm>
           <a:prstGeom prst="rect">
@@ -8316,7 +7556,7 @@
           <a:p>
             <a:pPr algn="ctr"/>
             <a:r>
-              <a:rPr lang="en-US" dirty="0"/>
+              <a:rPr lang="en-US" sz="2400" dirty="0"/>
               <a:t>MSLAB Chunk A</a:t>
             </a:r>
           </a:p>
@@ -8336,7 +7576,7 @@
         </p:nvSpPr>
         <p:spPr>
           <a:xfrm>
-            <a:off x="984592" y="3635508"/>
+            <a:off x="1384632" y="3635508"/>
             <a:ext cx="3657600" cy="446049"/>
           </a:xfrm>
           <a:prstGeom prst="rect">
@@ -8365,7 +7605,7 @@
           <a:p>
             <a:pPr algn="ctr"/>
             <a:r>
-              <a:rPr lang="en-US" dirty="0"/>
+              <a:rPr lang="en-US" sz="2400" dirty="0"/>
               <a:t>MSLAB Chunk B</a:t>
             </a:r>
           </a:p>
@@ -8385,7 +7625,7 @@
         </p:nvSpPr>
         <p:spPr>
           <a:xfrm>
-            <a:off x="4241032" y="3099695"/>
+            <a:off x="4641072" y="3099695"/>
             <a:ext cx="1037063" cy="446049"/>
           </a:xfrm>
           <a:prstGeom prst="rect">
@@ -8414,7 +7654,7 @@
           <a:p>
             <a:pPr algn="ctr"/>
             <a:r>
-              <a:rPr lang="en-US" dirty="0"/>
+              <a:rPr lang="en-US" sz="2400" dirty="0"/>
               <a:t>POJO</a:t>
             </a:r>
           </a:p>
@@ -8430,18 +7670,21 @@
             </a:extLst>
           </p:cNvPr>
           <p:cNvCxnSpPr>
+            <a:cxnSpLocks/>
             <a:stCxn id="2" idx="4"/>
-            <a:endCxn id="3" idx="0"/>
+            <a:endCxn id="183" idx="0"/>
           </p:cNvCxnSpPr>
           <p:nvPr/>
         </p:nvCxnSpPr>
         <p:spPr>
-          <a:xfrm rot="16200000" flipH="1">
-            <a:off x="1350416" y="2119179"/>
-            <a:ext cx="488557" cy="1472476"/>
+          <a:xfrm rot="5400000">
+            <a:off x="974436" y="2768922"/>
+            <a:ext cx="487147" cy="221925"/>
           </a:xfrm>
           <a:prstGeom prst="curvedConnector3">
-            <a:avLst/>
+            <a:avLst>
+              <a:gd name="adj1" fmla="val 50000"/>
+            </a:avLst>
           </a:prstGeom>
           <a:ln w="25400">
             <a:solidFill>
@@ -8483,8 +7726,8 @@
         </p:nvCxnSpPr>
         <p:spPr>
           <a:xfrm rot="16200000" flipH="1">
-            <a:off x="3591762" y="1931892"/>
-            <a:ext cx="471253" cy="1864351"/>
+            <a:off x="3922119" y="1862210"/>
+            <a:ext cx="463384" cy="2011586"/>
           </a:xfrm>
           <a:prstGeom prst="curvedConnector3">
             <a:avLst/>
@@ -8529,8 +7772,8 @@
         </p:nvCxnSpPr>
         <p:spPr>
           <a:xfrm rot="16200000" flipH="1">
-            <a:off x="1617622" y="2439738"/>
-            <a:ext cx="1016058" cy="1375481"/>
+            <a:off x="2074778" y="2496853"/>
+            <a:ext cx="999197" cy="1278112"/>
           </a:xfrm>
           <a:prstGeom prst="curvedConnector3">
             <a:avLst>
@@ -8569,14 +7812,14 @@
             </a:extLst>
           </p:cNvPr>
           <p:cNvSpPr>
-            <a:spLocks noChangeAspect="1"/>
+            <a:spLocks/>
           </p:cNvSpPr>
           <p:nvPr/>
         </p:nvSpPr>
         <p:spPr>
           <a:xfrm>
-            <a:off x="6160170" y="1052121"/>
-            <a:ext cx="5308784" cy="3317990"/>
+            <a:off x="6160168" y="1052121"/>
+            <a:ext cx="5943600" cy="3317990"/>
           </a:xfrm>
           <a:prstGeom prst="roundRect">
             <a:avLst/>
@@ -8643,7 +7886,7 @@
         </p:nvSpPr>
         <p:spPr>
           <a:xfrm>
-            <a:off x="7789894" y="644418"/>
+            <a:off x="8432836" y="301516"/>
             <a:ext cx="2033183" cy="914400"/>
           </a:xfrm>
           <a:prstGeom prst="rect">
@@ -8662,7 +7905,7 @@
           <a:p>
             <a:pPr algn="ctr"/>
             <a:r>
-              <a:rPr lang="en-US" sz="2400" b="1" dirty="0"/>
+              <a:rPr lang="en-US" sz="4400" b="1" dirty="0"/>
               <a:t>Serialized Segment</a:t>
             </a:r>
           </a:p>
@@ -8682,8 +7925,8 @@
         </p:nvSpPr>
         <p:spPr>
           <a:xfrm>
-            <a:off x="6342065" y="2086048"/>
-            <a:ext cx="4928839" cy="2073357"/>
+            <a:off x="6371205" y="2084925"/>
+            <a:ext cx="5542641" cy="2074480"/>
           </a:xfrm>
           <a:prstGeom prst="rect">
             <a:avLst/>
@@ -8719,15 +7962,15 @@
           <a:lstStyle/>
           <a:p>
             <a:r>
-              <a:rPr lang="en-US" b="1" dirty="0"/>
+              <a:rPr lang="en-US" sz="2800" b="1" dirty="0"/>
               <a:t>DATA</a:t>
             </a:r>
           </a:p>
           <a:p>
-            <a:endParaRPr lang="en-US" b="1" dirty="0"/>
-          </a:p>
-          <a:p>
-            <a:endParaRPr lang="en-US" b="1" dirty="0"/>
+            <a:endParaRPr lang="en-US" sz="2800" b="1" dirty="0"/>
+          </a:p>
+          <a:p>
+            <a:endParaRPr lang="en-US" sz="2800" b="1" dirty="0"/>
           </a:p>
         </p:txBody>
       </p:sp>
@@ -8745,8 +7988,8 @@
         </p:nvSpPr>
         <p:spPr>
           <a:xfrm>
-            <a:off x="6342065" y="1274106"/>
-            <a:ext cx="4928839" cy="811942"/>
+            <a:off x="6371205" y="1292968"/>
+            <a:ext cx="5542641" cy="793079"/>
           </a:xfrm>
           <a:prstGeom prst="rect">
             <a:avLst/>
@@ -8777,12 +8020,12 @@
           <a:lstStyle/>
           <a:p>
             <a:r>
-              <a:rPr lang="en-US" b="1" dirty="0">
+              <a:rPr lang="en-US" sz="2800" b="1" dirty="0">
                 <a:solidFill>
                   <a:schemeClr val="tx1"/>
                 </a:solidFill>
               </a:rPr>
-              <a:t>  INDEX</a:t>
+              <a:t>INDEX</a:t>
             </a:r>
           </a:p>
         </p:txBody>
@@ -8801,7 +8044,7 @@
         </p:nvSpPr>
         <p:spPr>
           <a:xfrm>
-            <a:off x="6446676" y="3099696"/>
+            <a:off x="7089618" y="3099696"/>
             <a:ext cx="3610979" cy="446049"/>
           </a:xfrm>
           <a:prstGeom prst="rect">
@@ -8830,7 +8073,7 @@
           <a:p>
             <a:pPr algn="ctr"/>
             <a:r>
-              <a:rPr lang="en-US" dirty="0"/>
+              <a:rPr lang="en-US" sz="2400" dirty="0"/>
               <a:t>MSLAB Chunk A</a:t>
             </a:r>
           </a:p>
@@ -8850,7 +8093,7 @@
         </p:nvSpPr>
         <p:spPr>
           <a:xfrm>
-            <a:off x="6977266" y="3635508"/>
+            <a:off x="7620208" y="3635508"/>
             <a:ext cx="3657600" cy="446049"/>
           </a:xfrm>
           <a:prstGeom prst="rect">
@@ -8879,7 +8122,7 @@
           <a:p>
             <a:pPr algn="ctr"/>
             <a:r>
-              <a:rPr lang="en-US" dirty="0"/>
+              <a:rPr lang="en-US" sz="2400" dirty="0"/>
               <a:t>MSLAB Chunk B</a:t>
             </a:r>
           </a:p>
@@ -8901,7 +8144,7 @@
         </p:nvCxnSpPr>
         <p:spPr>
           <a:xfrm rot="16200000" flipH="1">
-            <a:off x="9127165" y="2409743"/>
+            <a:off x="9770107" y="2409743"/>
             <a:ext cx="1731590" cy="719940"/>
           </a:xfrm>
           <a:prstGeom prst="curvedConnector3">
@@ -8949,7 +8192,7 @@
         </p:nvCxnSpPr>
         <p:spPr>
           <a:xfrm rot="5400000">
-            <a:off x="7930106" y="849392"/>
+            <a:off x="8573048" y="849392"/>
             <a:ext cx="1276356" cy="3252800"/>
           </a:xfrm>
           <a:prstGeom prst="curvedConnector3">
@@ -8996,7 +8239,7 @@
         </p:nvCxnSpPr>
         <p:spPr>
           <a:xfrm rot="5400000">
-            <a:off x="8485796" y="2223307"/>
+            <a:off x="9128738" y="2223307"/>
             <a:ext cx="1732471" cy="1091930"/>
           </a:xfrm>
           <a:prstGeom prst="curvedConnector3">
@@ -9038,16 +8281,19 @@
           <p:cNvCxnSpPr>
             <a:cxnSpLocks/>
             <a:stCxn id="76" idx="4"/>
+            <a:endCxn id="188" idx="0"/>
           </p:cNvCxnSpPr>
           <p:nvPr/>
         </p:nvCxnSpPr>
         <p:spPr>
-          <a:xfrm rot="16200000" flipH="1">
-            <a:off x="2361069" y="2480197"/>
-            <a:ext cx="493567" cy="745429"/>
-          </a:xfrm>
-          <a:prstGeom prst="curvedConnector2">
-            <a:avLst/>
+          <a:xfrm rot="5400000">
+            <a:off x="1831484" y="2399700"/>
+            <a:ext cx="473575" cy="946796"/>
+          </a:xfrm>
+          <a:prstGeom prst="curvedConnector3">
+            <a:avLst>
+              <a:gd name="adj1" fmla="val 50000"/>
+            </a:avLst>
           </a:prstGeom>
           <a:ln w="25400">
             <a:solidFill>
@@ -9088,8 +8334,8 @@
         </p:nvCxnSpPr>
         <p:spPr>
           <a:xfrm rot="16200000" flipH="1">
-            <a:off x="2929036" y="3136743"/>
-            <a:ext cx="997531" cy="2"/>
+            <a:off x="3291507" y="3099171"/>
+            <a:ext cx="999199" cy="73478"/>
           </a:xfrm>
           <a:prstGeom prst="curvedConnector3">
             <a:avLst>
@@ -9132,7 +8378,7 @@
         </p:nvSpPr>
         <p:spPr>
           <a:xfrm>
-            <a:off x="7346323" y="1429293"/>
+            <a:off x="7989265" y="1429293"/>
             <a:ext cx="3657600" cy="446049"/>
           </a:xfrm>
           <a:prstGeom prst="rect">
@@ -9160,7 +8406,7 @@
           <a:lstStyle/>
           <a:p>
             <a:r>
-              <a:rPr lang="en-US" dirty="0"/>
+              <a:rPr lang="en-US" sz="2400" dirty="0"/>
               <a:t>MSLAB Chunk C</a:t>
             </a:r>
           </a:p>
@@ -9180,7 +8426,7 @@
         </p:nvCxnSpPr>
         <p:spPr>
           <a:xfrm>
-            <a:off x="10057655" y="1383017"/>
+            <a:off x="10700597" y="1383017"/>
             <a:ext cx="0" cy="603725"/>
           </a:xfrm>
           <a:prstGeom prst="line">
@@ -9221,7 +8467,7 @@
         </p:nvCxnSpPr>
         <p:spPr>
           <a:xfrm>
-            <a:off x="10352930" y="1378214"/>
+            <a:off x="10995872" y="1378214"/>
             <a:ext cx="0" cy="603725"/>
           </a:xfrm>
           <a:prstGeom prst="line">
@@ -9262,7 +8508,7 @@
         </p:nvCxnSpPr>
         <p:spPr>
           <a:xfrm>
-            <a:off x="9433767" y="1395954"/>
+            <a:off x="10076709" y="1395954"/>
             <a:ext cx="0" cy="603725"/>
           </a:xfrm>
           <a:prstGeom prst="line">
@@ -9303,7 +8549,7 @@
         </p:nvCxnSpPr>
         <p:spPr>
           <a:xfrm>
-            <a:off x="9747876" y="1350454"/>
+            <a:off x="10390818" y="1350454"/>
             <a:ext cx="0" cy="603725"/>
           </a:xfrm>
           <a:prstGeom prst="line">
@@ -9344,7 +8590,7 @@
         </p:nvCxnSpPr>
         <p:spPr>
           <a:xfrm>
-            <a:off x="10680797" y="1400717"/>
+            <a:off x="11323739" y="1400717"/>
             <a:ext cx="0" cy="603725"/>
           </a:xfrm>
           <a:prstGeom prst="line">
@@ -9388,8 +8634,8 @@
         </p:nvCxnSpPr>
         <p:spPr>
           <a:xfrm rot="5400000">
-            <a:off x="3654663" y="2785203"/>
-            <a:ext cx="461715" cy="167267"/>
+            <a:off x="4049635" y="2788612"/>
+            <a:ext cx="463382" cy="158781"/>
           </a:xfrm>
           <a:prstGeom prst="curvedConnector3">
             <a:avLst>
@@ -9435,8 +8681,8 @@
         </p:nvCxnSpPr>
         <p:spPr>
           <a:xfrm rot="5400000">
-            <a:off x="3870027" y="3008986"/>
-            <a:ext cx="997528" cy="255517"/>
+            <a:off x="4304471" y="2972916"/>
+            <a:ext cx="999198" cy="325989"/>
           </a:xfrm>
           <a:prstGeom prst="curvedConnector3">
             <a:avLst>
@@ -9479,7 +8725,7 @@
         </p:nvSpPr>
         <p:spPr>
           <a:xfrm>
-            <a:off x="6731643" y="3113970"/>
+            <a:off x="7374585" y="3113970"/>
             <a:ext cx="420482" cy="342900"/>
           </a:xfrm>
           <a:prstGeom prst="rect">
@@ -9529,7 +8775,7 @@
         </p:nvSpPr>
         <p:spPr>
           <a:xfrm>
-            <a:off x="9984443" y="1494714"/>
+            <a:off x="10627385" y="1494714"/>
             <a:ext cx="420482" cy="342900"/>
           </a:xfrm>
           <a:prstGeom prst="rect">
@@ -9583,7 +8829,7 @@
         </p:nvCxnSpPr>
         <p:spPr>
           <a:xfrm rot="5400000">
-            <a:off x="8766215" y="1347371"/>
+            <a:off x="9409157" y="1347371"/>
             <a:ext cx="1238276" cy="2266374"/>
           </a:xfrm>
           <a:prstGeom prst="curvedConnector3">
@@ -9627,7 +8873,925 @@
         </p:nvSpPr>
         <p:spPr>
           <a:xfrm>
-            <a:off x="10308299" y="1518520"/>
+            <a:off x="10951241" y="1518520"/>
+            <a:ext cx="420482" cy="342900"/>
+          </a:xfrm>
+          <a:prstGeom prst="rect">
+            <a:avLst/>
+          </a:prstGeom>
+          <a:noFill/>
+          <a:ln>
+            <a:noFill/>
+          </a:ln>
+        </p:spPr>
+        <p:style>
+          <a:lnRef idx="2">
+            <a:schemeClr val="accent1">
+              <a:shade val="50000"/>
+            </a:schemeClr>
+          </a:lnRef>
+          <a:fillRef idx="1">
+            <a:schemeClr val="accent1"/>
+          </a:fillRef>
+          <a:effectRef idx="0">
+            <a:schemeClr val="accent1"/>
+          </a:effectRef>
+          <a:fontRef idx="minor">
+            <a:schemeClr val="lt1"/>
+          </a:fontRef>
+        </p:style>
+        <p:txBody>
+          <a:bodyPr rtlCol="0" anchor="ctr"/>
+          <a:lstStyle/>
+          <a:p>
+            <a:pPr algn="ctr"/>
+            <a:endParaRPr lang="en-US"/>
+          </a:p>
+        </p:txBody>
+      </p:sp>
+      <p:sp>
+        <p:nvSpPr>
+          <p:cNvPr id="160" name="Diamond 159">
+            <a:extLst>
+              <a:ext uri="{FF2B5EF4-FFF2-40B4-BE49-F238E27FC236}">
+                <a16:creationId xmlns:a16="http://schemas.microsoft.com/office/drawing/2014/main" id="{028AC7FC-A240-0841-8135-373727601A46}"/>
+              </a:ext>
+            </a:extLst>
+          </p:cNvPr>
+          <p:cNvSpPr>
+            <a:spLocks noChangeAspect="1"/>
+          </p:cNvSpPr>
+          <p:nvPr/>
+        </p:nvSpPr>
+        <p:spPr>
+          <a:xfrm rot="18971391">
+            <a:off x="2301992" y="1478998"/>
+            <a:ext cx="320040" cy="320040"/>
+          </a:xfrm>
+          <a:prstGeom prst="diamond">
+            <a:avLst/>
+          </a:prstGeom>
+          <a:solidFill>
+            <a:srgbClr val="0070C0"/>
+          </a:solidFill>
+          <a:ln>
+            <a:solidFill>
+              <a:schemeClr val="tx1"/>
+            </a:solidFill>
+          </a:ln>
+        </p:spPr>
+        <p:style>
+          <a:lnRef idx="1">
+            <a:schemeClr val="accent6"/>
+          </a:lnRef>
+          <a:fillRef idx="3">
+            <a:schemeClr val="accent6"/>
+          </a:fillRef>
+          <a:effectRef idx="2">
+            <a:schemeClr val="accent6"/>
+          </a:effectRef>
+          <a:fontRef idx="minor">
+            <a:schemeClr val="lt1"/>
+          </a:fontRef>
+        </p:style>
+        <p:txBody>
+          <a:bodyPr rtlCol="0" anchor="t">
+            <a:normAutofit fontScale="32500" lnSpcReduction="20000"/>
+          </a:bodyPr>
+          <a:lstStyle/>
+          <a:p>
+            <a:pPr algn="ctr"/>
+            <a:endParaRPr lang="en-US" sz="1600" dirty="0" err="1">
+              <a:solidFill>
+                <a:schemeClr val="tx1"/>
+              </a:solidFill>
+              <a:latin typeface="Arial" pitchFamily="34" charset="0"/>
+              <a:cs typeface="Arial" pitchFamily="34" charset="0"/>
+            </a:endParaRPr>
+          </a:p>
+        </p:txBody>
+      </p:sp>
+      <p:cxnSp>
+        <p:nvCxnSpPr>
+          <p:cNvPr id="161" name="Straight Arrow Connector 160">
+            <a:extLst>
+              <a:ext uri="{FF2B5EF4-FFF2-40B4-BE49-F238E27FC236}">
+                <a16:creationId xmlns:a16="http://schemas.microsoft.com/office/drawing/2014/main" id="{6BC247A3-4E45-6246-81B9-A4CAB56DC435}"/>
+              </a:ext>
+            </a:extLst>
+          </p:cNvPr>
+          <p:cNvCxnSpPr>
+            <a:cxnSpLocks/>
+            <a:stCxn id="170" idx="2"/>
+            <a:endCxn id="71" idx="0"/>
+          </p:cNvCxnSpPr>
+          <p:nvPr/>
+        </p:nvCxnSpPr>
+        <p:spPr>
+          <a:xfrm flipH="1">
+            <a:off x="1935320" y="1754494"/>
+            <a:ext cx="888451" cy="528250"/>
+          </a:xfrm>
+          <a:prstGeom prst="straightConnector1">
+            <a:avLst/>
+          </a:prstGeom>
+          <a:ln w="38100">
+            <a:solidFill>
+              <a:srgbClr val="000000"/>
+            </a:solidFill>
+            <a:tailEnd type="arrow"/>
+          </a:ln>
+        </p:spPr>
+        <p:style>
+          <a:lnRef idx="1">
+            <a:schemeClr val="accent1"/>
+          </a:lnRef>
+          <a:fillRef idx="0">
+            <a:schemeClr val="accent1"/>
+          </a:fillRef>
+          <a:effectRef idx="0">
+            <a:schemeClr val="accent1"/>
+          </a:effectRef>
+          <a:fontRef idx="minor">
+            <a:schemeClr val="tx1"/>
+          </a:fontRef>
+        </p:style>
+      </p:cxnSp>
+      <p:cxnSp>
+        <p:nvCxnSpPr>
+          <p:cNvPr id="162" name="Straight Arrow Connector 161">
+            <a:extLst>
+              <a:ext uri="{FF2B5EF4-FFF2-40B4-BE49-F238E27FC236}">
+                <a16:creationId xmlns:a16="http://schemas.microsoft.com/office/drawing/2014/main" id="{B1389840-B632-954B-A573-AE63A1C0BFC7}"/>
+              </a:ext>
+            </a:extLst>
+          </p:cNvPr>
+          <p:cNvCxnSpPr>
+            <a:cxnSpLocks/>
+            <a:stCxn id="160" idx="1"/>
+            <a:endCxn id="2" idx="0"/>
+          </p:cNvCxnSpPr>
+          <p:nvPr/>
+        </p:nvCxnSpPr>
+        <p:spPr>
+          <a:xfrm flipH="1">
+            <a:off x="1328971" y="1749795"/>
+            <a:ext cx="1017565" cy="532949"/>
+          </a:xfrm>
+          <a:prstGeom prst="straightConnector1">
+            <a:avLst/>
+          </a:prstGeom>
+          <a:ln w="38100">
+            <a:solidFill>
+              <a:srgbClr val="000000"/>
+            </a:solidFill>
+            <a:tailEnd type="arrow"/>
+          </a:ln>
+        </p:spPr>
+        <p:style>
+          <a:lnRef idx="1">
+            <a:schemeClr val="accent1"/>
+          </a:lnRef>
+          <a:fillRef idx="0">
+            <a:schemeClr val="accent1"/>
+          </a:fillRef>
+          <a:effectRef idx="0">
+            <a:schemeClr val="accent1"/>
+          </a:effectRef>
+          <a:fontRef idx="minor">
+            <a:schemeClr val="tx1"/>
+          </a:fontRef>
+        </p:style>
+      </p:cxnSp>
+      <p:cxnSp>
+        <p:nvCxnSpPr>
+          <p:cNvPr id="163" name="Straight Arrow Connector 162">
+            <a:extLst>
+              <a:ext uri="{FF2B5EF4-FFF2-40B4-BE49-F238E27FC236}">
+                <a16:creationId xmlns:a16="http://schemas.microsoft.com/office/drawing/2014/main" id="{5C719B9C-1772-5740-A8E1-763CA07C65E4}"/>
+              </a:ext>
+            </a:extLst>
+          </p:cNvPr>
+          <p:cNvCxnSpPr>
+            <a:cxnSpLocks/>
+            <a:stCxn id="168" idx="2"/>
+            <a:endCxn id="76" idx="0"/>
+          </p:cNvCxnSpPr>
+          <p:nvPr/>
+        </p:nvCxnSpPr>
+        <p:spPr>
+          <a:xfrm flipH="1">
+            <a:off x="2541669" y="1754494"/>
+            <a:ext cx="533084" cy="528250"/>
+          </a:xfrm>
+          <a:prstGeom prst="straightConnector1">
+            <a:avLst/>
+          </a:prstGeom>
+          <a:ln w="38100">
+            <a:solidFill>
+              <a:srgbClr val="000000"/>
+            </a:solidFill>
+            <a:tailEnd type="arrow"/>
+          </a:ln>
+        </p:spPr>
+        <p:style>
+          <a:lnRef idx="1">
+            <a:schemeClr val="accent1"/>
+          </a:lnRef>
+          <a:fillRef idx="0">
+            <a:schemeClr val="accent1"/>
+          </a:fillRef>
+          <a:effectRef idx="0">
+            <a:schemeClr val="accent1"/>
+          </a:effectRef>
+          <a:fontRef idx="minor">
+            <a:schemeClr val="tx1"/>
+          </a:fontRef>
+        </p:style>
+      </p:cxnSp>
+      <p:cxnSp>
+        <p:nvCxnSpPr>
+          <p:cNvPr id="164" name="Straight Arrow Connector 163">
+            <a:extLst>
+              <a:ext uri="{FF2B5EF4-FFF2-40B4-BE49-F238E27FC236}">
+                <a16:creationId xmlns:a16="http://schemas.microsoft.com/office/drawing/2014/main" id="{A0677E7B-0247-074B-B556-4F6B4560C52C}"/>
+              </a:ext>
+            </a:extLst>
+          </p:cNvPr>
+          <p:cNvCxnSpPr>
+            <a:cxnSpLocks/>
+            <a:stCxn id="171" idx="1"/>
+            <a:endCxn id="75" idx="0"/>
+          </p:cNvCxnSpPr>
+          <p:nvPr/>
+        </p:nvCxnSpPr>
+        <p:spPr>
+          <a:xfrm flipH="1">
+            <a:off x="3148018" y="1749795"/>
+            <a:ext cx="202446" cy="532949"/>
+          </a:xfrm>
+          <a:prstGeom prst="straightConnector1">
+            <a:avLst/>
+          </a:prstGeom>
+          <a:ln w="38100">
+            <a:solidFill>
+              <a:srgbClr val="000000"/>
+            </a:solidFill>
+            <a:tailEnd type="arrow"/>
+          </a:ln>
+        </p:spPr>
+        <p:style>
+          <a:lnRef idx="1">
+            <a:schemeClr val="accent1"/>
+          </a:lnRef>
+          <a:fillRef idx="0">
+            <a:schemeClr val="accent1"/>
+          </a:fillRef>
+          <a:effectRef idx="0">
+            <a:schemeClr val="accent1"/>
+          </a:effectRef>
+          <a:fontRef idx="minor">
+            <a:schemeClr val="tx1"/>
+          </a:fontRef>
+        </p:style>
+      </p:cxnSp>
+      <p:cxnSp>
+        <p:nvCxnSpPr>
+          <p:cNvPr id="165" name="Straight Arrow Connector 164">
+            <a:extLst>
+              <a:ext uri="{FF2B5EF4-FFF2-40B4-BE49-F238E27FC236}">
+                <a16:creationId xmlns:a16="http://schemas.microsoft.com/office/drawing/2014/main" id="{45908A99-70B6-264B-9C18-58CECC7302C0}"/>
+              </a:ext>
+            </a:extLst>
+          </p:cNvPr>
+          <p:cNvCxnSpPr>
+            <a:cxnSpLocks/>
+            <a:stCxn id="174" idx="1"/>
+            <a:endCxn id="72" idx="0"/>
+          </p:cNvCxnSpPr>
+          <p:nvPr/>
+        </p:nvCxnSpPr>
+        <p:spPr>
+          <a:xfrm>
+            <a:off x="3601446" y="1749795"/>
+            <a:ext cx="152921" cy="532949"/>
+          </a:xfrm>
+          <a:prstGeom prst="straightConnector1">
+            <a:avLst/>
+          </a:prstGeom>
+          <a:ln w="38100">
+            <a:solidFill>
+              <a:srgbClr val="000000"/>
+            </a:solidFill>
+            <a:tailEnd type="arrow"/>
+          </a:ln>
+        </p:spPr>
+        <p:style>
+          <a:lnRef idx="1">
+            <a:schemeClr val="accent1"/>
+          </a:lnRef>
+          <a:fillRef idx="0">
+            <a:schemeClr val="accent1"/>
+          </a:fillRef>
+          <a:effectRef idx="0">
+            <a:schemeClr val="accent1"/>
+          </a:effectRef>
+          <a:fontRef idx="minor">
+            <a:schemeClr val="tx1"/>
+          </a:fontRef>
+        </p:style>
+      </p:cxnSp>
+      <p:cxnSp>
+        <p:nvCxnSpPr>
+          <p:cNvPr id="166" name="Straight Arrow Connector 165">
+            <a:extLst>
+              <a:ext uri="{FF2B5EF4-FFF2-40B4-BE49-F238E27FC236}">
+                <a16:creationId xmlns:a16="http://schemas.microsoft.com/office/drawing/2014/main" id="{1EBE5ADE-5E1A-D14D-8EFE-14E56CF8901A}"/>
+              </a:ext>
+            </a:extLst>
+          </p:cNvPr>
+          <p:cNvCxnSpPr>
+            <a:cxnSpLocks/>
+            <a:stCxn id="172" idx="2"/>
+            <a:endCxn id="73" idx="0"/>
+          </p:cNvCxnSpPr>
+          <p:nvPr/>
+        </p:nvCxnSpPr>
+        <p:spPr>
+          <a:xfrm>
+            <a:off x="4078681" y="1754494"/>
+            <a:ext cx="282035" cy="528250"/>
+          </a:xfrm>
+          <a:prstGeom prst="straightConnector1">
+            <a:avLst/>
+          </a:prstGeom>
+          <a:ln w="38100">
+            <a:solidFill>
+              <a:srgbClr val="000000"/>
+            </a:solidFill>
+            <a:tailEnd type="arrow"/>
+          </a:ln>
+        </p:spPr>
+        <p:style>
+          <a:lnRef idx="1">
+            <a:schemeClr val="accent1"/>
+          </a:lnRef>
+          <a:fillRef idx="0">
+            <a:schemeClr val="accent1"/>
+          </a:fillRef>
+          <a:effectRef idx="0">
+            <a:schemeClr val="accent1"/>
+          </a:effectRef>
+          <a:fontRef idx="minor">
+            <a:schemeClr val="tx1"/>
+          </a:fontRef>
+        </p:style>
+      </p:cxnSp>
+      <p:cxnSp>
+        <p:nvCxnSpPr>
+          <p:cNvPr id="167" name="Straight Arrow Connector 166">
+            <a:extLst>
+              <a:ext uri="{FF2B5EF4-FFF2-40B4-BE49-F238E27FC236}">
+                <a16:creationId xmlns:a16="http://schemas.microsoft.com/office/drawing/2014/main" id="{50902DC7-B860-9048-BC27-0D08F812478E}"/>
+              </a:ext>
+            </a:extLst>
+          </p:cNvPr>
+          <p:cNvCxnSpPr>
+            <a:cxnSpLocks/>
+            <a:stCxn id="173" idx="2"/>
+            <a:endCxn id="74" idx="0"/>
+          </p:cNvCxnSpPr>
+          <p:nvPr/>
+        </p:nvCxnSpPr>
+        <p:spPr>
+          <a:xfrm>
+            <a:off x="4329663" y="1754494"/>
+            <a:ext cx="637401" cy="528250"/>
+          </a:xfrm>
+          <a:prstGeom prst="straightConnector1">
+            <a:avLst/>
+          </a:prstGeom>
+          <a:ln w="38100">
+            <a:solidFill>
+              <a:srgbClr val="000000"/>
+            </a:solidFill>
+            <a:tailEnd type="arrow"/>
+          </a:ln>
+        </p:spPr>
+        <p:style>
+          <a:lnRef idx="1">
+            <a:schemeClr val="accent1"/>
+          </a:lnRef>
+          <a:fillRef idx="0">
+            <a:schemeClr val="accent1"/>
+          </a:fillRef>
+          <a:effectRef idx="0">
+            <a:schemeClr val="accent1"/>
+          </a:effectRef>
+          <a:fontRef idx="minor">
+            <a:schemeClr val="tx1"/>
+          </a:fontRef>
+        </p:style>
+      </p:cxnSp>
+      <p:sp>
+        <p:nvSpPr>
+          <p:cNvPr id="168" name="Diamond 167">
+            <a:extLst>
+              <a:ext uri="{FF2B5EF4-FFF2-40B4-BE49-F238E27FC236}">
+                <a16:creationId xmlns:a16="http://schemas.microsoft.com/office/drawing/2014/main" id="{5B1E02D9-FF16-1E4A-869F-B1054AE3C255}"/>
+              </a:ext>
+            </a:extLst>
+          </p:cNvPr>
+          <p:cNvSpPr>
+            <a:spLocks noChangeAspect="1"/>
+          </p:cNvSpPr>
+          <p:nvPr/>
+        </p:nvSpPr>
+        <p:spPr>
+          <a:xfrm rot="18971391">
+            <a:off x="2803956" y="1478998"/>
+            <a:ext cx="320040" cy="320040"/>
+          </a:xfrm>
+          <a:prstGeom prst="diamond">
+            <a:avLst/>
+          </a:prstGeom>
+          <a:solidFill>
+            <a:srgbClr val="0070C0"/>
+          </a:solidFill>
+          <a:ln>
+            <a:solidFill>
+              <a:schemeClr val="tx1"/>
+            </a:solidFill>
+          </a:ln>
+        </p:spPr>
+        <p:style>
+          <a:lnRef idx="1">
+            <a:schemeClr val="accent6"/>
+          </a:lnRef>
+          <a:fillRef idx="3">
+            <a:schemeClr val="accent6"/>
+          </a:fillRef>
+          <a:effectRef idx="2">
+            <a:schemeClr val="accent6"/>
+          </a:effectRef>
+          <a:fontRef idx="minor">
+            <a:schemeClr val="lt1"/>
+          </a:fontRef>
+        </p:style>
+        <p:txBody>
+          <a:bodyPr rtlCol="0" anchor="t">
+            <a:normAutofit fontScale="32500" lnSpcReduction="20000"/>
+          </a:bodyPr>
+          <a:lstStyle/>
+          <a:p>
+            <a:pPr algn="ctr"/>
+            <a:endParaRPr lang="en-US" sz="1600" dirty="0" err="1">
+              <a:solidFill>
+                <a:schemeClr val="tx1"/>
+              </a:solidFill>
+              <a:latin typeface="Arial" pitchFamily="34" charset="0"/>
+              <a:cs typeface="Arial" pitchFamily="34" charset="0"/>
+            </a:endParaRPr>
+          </a:p>
+        </p:txBody>
+      </p:sp>
+      <p:sp>
+        <p:nvSpPr>
+          <p:cNvPr id="169" name="Diamond 168">
+            <a:extLst>
+              <a:ext uri="{FF2B5EF4-FFF2-40B4-BE49-F238E27FC236}">
+                <a16:creationId xmlns:a16="http://schemas.microsoft.com/office/drawing/2014/main" id="{9CD68CB3-F46D-B943-9244-99307F1DE065}"/>
+              </a:ext>
+            </a:extLst>
+          </p:cNvPr>
+          <p:cNvSpPr>
+            <a:spLocks noChangeAspect="1"/>
+          </p:cNvSpPr>
+          <p:nvPr/>
+        </p:nvSpPr>
+        <p:spPr>
+          <a:xfrm rot="18971391">
+            <a:off x="3054938" y="1478998"/>
+            <a:ext cx="320040" cy="320040"/>
+          </a:xfrm>
+          <a:prstGeom prst="diamond">
+            <a:avLst/>
+          </a:prstGeom>
+          <a:solidFill>
+            <a:srgbClr val="0070C0"/>
+          </a:solidFill>
+          <a:ln>
+            <a:solidFill>
+              <a:schemeClr val="tx1"/>
+            </a:solidFill>
+          </a:ln>
+        </p:spPr>
+        <p:style>
+          <a:lnRef idx="1">
+            <a:schemeClr val="accent6"/>
+          </a:lnRef>
+          <a:fillRef idx="3">
+            <a:schemeClr val="accent6"/>
+          </a:fillRef>
+          <a:effectRef idx="2">
+            <a:schemeClr val="accent6"/>
+          </a:effectRef>
+          <a:fontRef idx="minor">
+            <a:schemeClr val="lt1"/>
+          </a:fontRef>
+        </p:style>
+        <p:txBody>
+          <a:bodyPr rtlCol="0" anchor="t">
+            <a:normAutofit fontScale="32500" lnSpcReduction="20000"/>
+          </a:bodyPr>
+          <a:lstStyle/>
+          <a:p>
+            <a:pPr algn="ctr"/>
+            <a:endParaRPr lang="en-US" sz="1600" dirty="0" err="1">
+              <a:solidFill>
+                <a:schemeClr val="tx1"/>
+              </a:solidFill>
+              <a:latin typeface="Arial" pitchFamily="34" charset="0"/>
+              <a:cs typeface="Arial" pitchFamily="34" charset="0"/>
+            </a:endParaRPr>
+          </a:p>
+        </p:txBody>
+      </p:sp>
+      <p:sp>
+        <p:nvSpPr>
+          <p:cNvPr id="170" name="Diamond 169">
+            <a:extLst>
+              <a:ext uri="{FF2B5EF4-FFF2-40B4-BE49-F238E27FC236}">
+                <a16:creationId xmlns:a16="http://schemas.microsoft.com/office/drawing/2014/main" id="{5F82B400-4F2A-CD4A-B603-BF5FDB9E9BED}"/>
+              </a:ext>
+            </a:extLst>
+          </p:cNvPr>
+          <p:cNvSpPr>
+            <a:spLocks noChangeAspect="1"/>
+          </p:cNvSpPr>
+          <p:nvPr/>
+        </p:nvSpPr>
+        <p:spPr>
+          <a:xfrm rot="18971391">
+            <a:off x="2552974" y="1478998"/>
+            <a:ext cx="320040" cy="320040"/>
+          </a:xfrm>
+          <a:prstGeom prst="diamond">
+            <a:avLst/>
+          </a:prstGeom>
+          <a:solidFill>
+            <a:srgbClr val="0070C0"/>
+          </a:solidFill>
+          <a:ln>
+            <a:solidFill>
+              <a:schemeClr val="tx1"/>
+            </a:solidFill>
+          </a:ln>
+        </p:spPr>
+        <p:style>
+          <a:lnRef idx="1">
+            <a:schemeClr val="accent6"/>
+          </a:lnRef>
+          <a:fillRef idx="3">
+            <a:schemeClr val="accent6"/>
+          </a:fillRef>
+          <a:effectRef idx="2">
+            <a:schemeClr val="accent6"/>
+          </a:effectRef>
+          <a:fontRef idx="minor">
+            <a:schemeClr val="lt1"/>
+          </a:fontRef>
+        </p:style>
+        <p:txBody>
+          <a:bodyPr rtlCol="0" anchor="t">
+            <a:normAutofit fontScale="32500" lnSpcReduction="20000"/>
+          </a:bodyPr>
+          <a:lstStyle/>
+          <a:p>
+            <a:pPr algn="ctr"/>
+            <a:endParaRPr lang="en-US" sz="1600" dirty="0" err="1">
+              <a:solidFill>
+                <a:schemeClr val="tx1"/>
+              </a:solidFill>
+              <a:latin typeface="Arial" pitchFamily="34" charset="0"/>
+              <a:cs typeface="Arial" pitchFamily="34" charset="0"/>
+            </a:endParaRPr>
+          </a:p>
+        </p:txBody>
+      </p:sp>
+      <p:sp>
+        <p:nvSpPr>
+          <p:cNvPr id="171" name="Diamond 170">
+            <a:extLst>
+              <a:ext uri="{FF2B5EF4-FFF2-40B4-BE49-F238E27FC236}">
+                <a16:creationId xmlns:a16="http://schemas.microsoft.com/office/drawing/2014/main" id="{AD3070AB-73B7-B744-926B-08E823381CFF}"/>
+              </a:ext>
+            </a:extLst>
+          </p:cNvPr>
+          <p:cNvSpPr>
+            <a:spLocks noChangeAspect="1"/>
+          </p:cNvSpPr>
+          <p:nvPr/>
+        </p:nvSpPr>
+        <p:spPr>
+          <a:xfrm rot="18971391">
+            <a:off x="3305920" y="1478998"/>
+            <a:ext cx="320040" cy="320040"/>
+          </a:xfrm>
+          <a:prstGeom prst="diamond">
+            <a:avLst/>
+          </a:prstGeom>
+          <a:solidFill>
+            <a:srgbClr val="0070C0"/>
+          </a:solidFill>
+          <a:ln>
+            <a:solidFill>
+              <a:schemeClr val="tx1"/>
+            </a:solidFill>
+          </a:ln>
+        </p:spPr>
+        <p:style>
+          <a:lnRef idx="1">
+            <a:schemeClr val="accent6"/>
+          </a:lnRef>
+          <a:fillRef idx="3">
+            <a:schemeClr val="accent6"/>
+          </a:fillRef>
+          <a:effectRef idx="2">
+            <a:schemeClr val="accent6"/>
+          </a:effectRef>
+          <a:fontRef idx="minor">
+            <a:schemeClr val="lt1"/>
+          </a:fontRef>
+        </p:style>
+        <p:txBody>
+          <a:bodyPr rtlCol="0" anchor="t">
+            <a:normAutofit fontScale="32500" lnSpcReduction="20000"/>
+          </a:bodyPr>
+          <a:lstStyle/>
+          <a:p>
+            <a:pPr algn="ctr"/>
+            <a:endParaRPr lang="en-US" sz="1600" dirty="0" err="1">
+              <a:solidFill>
+                <a:schemeClr val="tx1"/>
+              </a:solidFill>
+              <a:latin typeface="Arial" pitchFamily="34" charset="0"/>
+              <a:cs typeface="Arial" pitchFamily="34" charset="0"/>
+            </a:endParaRPr>
+          </a:p>
+        </p:txBody>
+      </p:sp>
+      <p:sp>
+        <p:nvSpPr>
+          <p:cNvPr id="172" name="Diamond 171">
+            <a:extLst>
+              <a:ext uri="{FF2B5EF4-FFF2-40B4-BE49-F238E27FC236}">
+                <a16:creationId xmlns:a16="http://schemas.microsoft.com/office/drawing/2014/main" id="{F4CE22DD-7248-494E-849E-1149355DEA62}"/>
+              </a:ext>
+            </a:extLst>
+          </p:cNvPr>
+          <p:cNvSpPr>
+            <a:spLocks noChangeAspect="1"/>
+          </p:cNvSpPr>
+          <p:nvPr/>
+        </p:nvSpPr>
+        <p:spPr>
+          <a:xfrm rot="18971391">
+            <a:off x="3807884" y="1478998"/>
+            <a:ext cx="320040" cy="320040"/>
+          </a:xfrm>
+          <a:prstGeom prst="diamond">
+            <a:avLst/>
+          </a:prstGeom>
+          <a:solidFill>
+            <a:srgbClr val="0070C0"/>
+          </a:solidFill>
+          <a:ln>
+            <a:solidFill>
+              <a:schemeClr val="tx1"/>
+            </a:solidFill>
+          </a:ln>
+        </p:spPr>
+        <p:style>
+          <a:lnRef idx="1">
+            <a:schemeClr val="accent6"/>
+          </a:lnRef>
+          <a:fillRef idx="3">
+            <a:schemeClr val="accent6"/>
+          </a:fillRef>
+          <a:effectRef idx="2">
+            <a:schemeClr val="accent6"/>
+          </a:effectRef>
+          <a:fontRef idx="minor">
+            <a:schemeClr val="lt1"/>
+          </a:fontRef>
+        </p:style>
+        <p:txBody>
+          <a:bodyPr rtlCol="0" anchor="t">
+            <a:normAutofit fontScale="32500" lnSpcReduction="20000"/>
+          </a:bodyPr>
+          <a:lstStyle/>
+          <a:p>
+            <a:pPr algn="ctr"/>
+            <a:endParaRPr lang="en-US" sz="1600" dirty="0" err="1">
+              <a:solidFill>
+                <a:schemeClr val="tx1"/>
+              </a:solidFill>
+              <a:latin typeface="Arial" pitchFamily="34" charset="0"/>
+              <a:cs typeface="Arial" pitchFamily="34" charset="0"/>
+            </a:endParaRPr>
+          </a:p>
+        </p:txBody>
+      </p:sp>
+      <p:sp>
+        <p:nvSpPr>
+          <p:cNvPr id="173" name="Diamond 172">
+            <a:extLst>
+              <a:ext uri="{FF2B5EF4-FFF2-40B4-BE49-F238E27FC236}">
+                <a16:creationId xmlns:a16="http://schemas.microsoft.com/office/drawing/2014/main" id="{E25C73C0-0C56-0348-85FC-5E3B4F8C63CB}"/>
+              </a:ext>
+            </a:extLst>
+          </p:cNvPr>
+          <p:cNvSpPr>
+            <a:spLocks noChangeAspect="1"/>
+          </p:cNvSpPr>
+          <p:nvPr/>
+        </p:nvSpPr>
+        <p:spPr>
+          <a:xfrm rot="18971391">
+            <a:off x="4058866" y="1478998"/>
+            <a:ext cx="320040" cy="320040"/>
+          </a:xfrm>
+          <a:prstGeom prst="diamond">
+            <a:avLst/>
+          </a:prstGeom>
+          <a:solidFill>
+            <a:srgbClr val="0070C0"/>
+          </a:solidFill>
+          <a:ln>
+            <a:solidFill>
+              <a:schemeClr val="tx1"/>
+            </a:solidFill>
+          </a:ln>
+        </p:spPr>
+        <p:style>
+          <a:lnRef idx="1">
+            <a:schemeClr val="accent6"/>
+          </a:lnRef>
+          <a:fillRef idx="3">
+            <a:schemeClr val="accent6"/>
+          </a:fillRef>
+          <a:effectRef idx="2">
+            <a:schemeClr val="accent6"/>
+          </a:effectRef>
+          <a:fontRef idx="minor">
+            <a:schemeClr val="lt1"/>
+          </a:fontRef>
+        </p:style>
+        <p:txBody>
+          <a:bodyPr rtlCol="0" anchor="t">
+            <a:normAutofit fontScale="32500" lnSpcReduction="20000"/>
+          </a:bodyPr>
+          <a:lstStyle/>
+          <a:p>
+            <a:pPr algn="ctr"/>
+            <a:endParaRPr lang="en-US" sz="1600" dirty="0" err="1">
+              <a:solidFill>
+                <a:schemeClr val="tx1"/>
+              </a:solidFill>
+              <a:latin typeface="Arial" pitchFamily="34" charset="0"/>
+              <a:cs typeface="Arial" pitchFamily="34" charset="0"/>
+            </a:endParaRPr>
+          </a:p>
+        </p:txBody>
+      </p:sp>
+      <p:sp>
+        <p:nvSpPr>
+          <p:cNvPr id="174" name="Diamond 173">
+            <a:extLst>
+              <a:ext uri="{FF2B5EF4-FFF2-40B4-BE49-F238E27FC236}">
+                <a16:creationId xmlns:a16="http://schemas.microsoft.com/office/drawing/2014/main" id="{3F3FCF9F-51C6-8043-B0FB-3304C18F1778}"/>
+              </a:ext>
+            </a:extLst>
+          </p:cNvPr>
+          <p:cNvSpPr>
+            <a:spLocks noChangeAspect="1"/>
+          </p:cNvSpPr>
+          <p:nvPr/>
+        </p:nvSpPr>
+        <p:spPr>
+          <a:xfrm rot="18971391">
+            <a:off x="3556902" y="1478998"/>
+            <a:ext cx="320040" cy="320040"/>
+          </a:xfrm>
+          <a:prstGeom prst="diamond">
+            <a:avLst/>
+          </a:prstGeom>
+          <a:solidFill>
+            <a:srgbClr val="0070C0"/>
+          </a:solidFill>
+          <a:ln>
+            <a:solidFill>
+              <a:schemeClr val="tx1"/>
+            </a:solidFill>
+          </a:ln>
+        </p:spPr>
+        <p:style>
+          <a:lnRef idx="1">
+            <a:schemeClr val="accent6"/>
+          </a:lnRef>
+          <a:fillRef idx="3">
+            <a:schemeClr val="accent6"/>
+          </a:fillRef>
+          <a:effectRef idx="2">
+            <a:schemeClr val="accent6"/>
+          </a:effectRef>
+          <a:fontRef idx="minor">
+            <a:schemeClr val="lt1"/>
+          </a:fontRef>
+        </p:style>
+        <p:txBody>
+          <a:bodyPr rtlCol="0" anchor="t">
+            <a:normAutofit fontScale="32500" lnSpcReduction="20000"/>
+          </a:bodyPr>
+          <a:lstStyle/>
+          <a:p>
+            <a:pPr algn="ctr"/>
+            <a:endParaRPr lang="en-US" sz="1600" dirty="0" err="1">
+              <a:solidFill>
+                <a:schemeClr val="tx1"/>
+              </a:solidFill>
+              <a:latin typeface="Arial" pitchFamily="34" charset="0"/>
+              <a:cs typeface="Arial" pitchFamily="34" charset="0"/>
+            </a:endParaRPr>
+          </a:p>
+        </p:txBody>
+      </p:sp>
+      <p:sp>
+        <p:nvSpPr>
+          <p:cNvPr id="183" name="Rectangle 182">
+            <a:extLst>
+              <a:ext uri="{FF2B5EF4-FFF2-40B4-BE49-F238E27FC236}">
+                <a16:creationId xmlns:a16="http://schemas.microsoft.com/office/drawing/2014/main" id="{8B25D594-B5F9-2D4E-9C68-DAC02D3BA531}"/>
+              </a:ext>
+            </a:extLst>
+          </p:cNvPr>
+          <p:cNvSpPr/>
+          <p:nvPr/>
+        </p:nvSpPr>
+        <p:spPr>
+          <a:xfrm>
+            <a:off x="896805" y="3123458"/>
+            <a:ext cx="420482" cy="342900"/>
+          </a:xfrm>
+          <a:prstGeom prst="rect">
+            <a:avLst/>
+          </a:prstGeom>
+          <a:noFill/>
+          <a:ln>
+            <a:noFill/>
+          </a:ln>
+        </p:spPr>
+        <p:style>
+          <a:lnRef idx="2">
+            <a:schemeClr val="accent1">
+              <a:shade val="50000"/>
+            </a:schemeClr>
+          </a:lnRef>
+          <a:fillRef idx="1">
+            <a:schemeClr val="accent1"/>
+          </a:fillRef>
+          <a:effectRef idx="0">
+            <a:schemeClr val="accent1"/>
+          </a:effectRef>
+          <a:fontRef idx="minor">
+            <a:schemeClr val="lt1"/>
+          </a:fontRef>
+        </p:style>
+        <p:txBody>
+          <a:bodyPr rtlCol="0" anchor="ctr"/>
+          <a:lstStyle/>
+          <a:p>
+            <a:pPr algn="ctr"/>
+            <a:endParaRPr lang="en-US"/>
+          </a:p>
+        </p:txBody>
+      </p:sp>
+      <p:sp>
+        <p:nvSpPr>
+          <p:cNvPr id="188" name="Rectangle 187">
+            <a:extLst>
+              <a:ext uri="{FF2B5EF4-FFF2-40B4-BE49-F238E27FC236}">
+                <a16:creationId xmlns:a16="http://schemas.microsoft.com/office/drawing/2014/main" id="{590540D6-325D-8E47-A9BA-D2525D663307}"/>
+              </a:ext>
+            </a:extLst>
+          </p:cNvPr>
+          <p:cNvSpPr/>
+          <p:nvPr/>
+        </p:nvSpPr>
+        <p:spPr>
+          <a:xfrm>
+            <a:off x="1384632" y="3109886"/>
             <a:ext cx="420482" cy="342900"/>
           </a:xfrm>
           <a:prstGeom prst="rect">

</xml_diff>